<commit_message>
Add images showing the difference between mcq and single answer in UG
</commit_message>
<xml_diff>
--- a/docs/diagrams/Test session images for User guide.pptx
+++ b/docs/diagrams/Test session images for User guide.pptx
@@ -12,6 +12,7 @@
     <p:sldId id="268" r:id="rId6"/>
     <p:sldId id="278" r:id="rId7"/>
     <p:sldId id="275" r:id="rId8"/>
+    <p:sldId id="280" r:id="rId9"/>
   </p:sldIdLst>
   <p:sldSz cx="12192000" cy="6858000"/>
   <p:notesSz cx="6858000" cy="9144000"/>
@@ -267,7 +268,7 @@
           <a:p>
             <a:fld id="{1F8333B6-6859-461A-835D-16D711F5D478}" type="datetimeFigureOut">
               <a:rPr lang="en-SG" smtClean="0"/>
-              <a:t>13/4/2019</a:t>
+              <a:t>14/4/2019</a:t>
             </a:fld>
             <a:endParaRPr lang="en-SG"/>
           </a:p>
@@ -467,7 +468,7 @@
           <a:p>
             <a:fld id="{1F8333B6-6859-461A-835D-16D711F5D478}" type="datetimeFigureOut">
               <a:rPr lang="en-SG" smtClean="0"/>
-              <a:t>13/4/2019</a:t>
+              <a:t>14/4/2019</a:t>
             </a:fld>
             <a:endParaRPr lang="en-SG"/>
           </a:p>
@@ -677,7 +678,7 @@
           <a:p>
             <a:fld id="{1F8333B6-6859-461A-835D-16D711F5D478}" type="datetimeFigureOut">
               <a:rPr lang="en-SG" smtClean="0"/>
-              <a:t>13/4/2019</a:t>
+              <a:t>14/4/2019</a:t>
             </a:fld>
             <a:endParaRPr lang="en-SG"/>
           </a:p>
@@ -877,7 +878,7 @@
           <a:p>
             <a:fld id="{1F8333B6-6859-461A-835D-16D711F5D478}" type="datetimeFigureOut">
               <a:rPr lang="en-SG" smtClean="0"/>
-              <a:t>13/4/2019</a:t>
+              <a:t>14/4/2019</a:t>
             </a:fld>
             <a:endParaRPr lang="en-SG"/>
           </a:p>
@@ -1153,7 +1154,7 @@
           <a:p>
             <a:fld id="{1F8333B6-6859-461A-835D-16D711F5D478}" type="datetimeFigureOut">
               <a:rPr lang="en-SG" smtClean="0"/>
-              <a:t>13/4/2019</a:t>
+              <a:t>14/4/2019</a:t>
             </a:fld>
             <a:endParaRPr lang="en-SG"/>
           </a:p>
@@ -1421,7 +1422,7 @@
           <a:p>
             <a:fld id="{1F8333B6-6859-461A-835D-16D711F5D478}" type="datetimeFigureOut">
               <a:rPr lang="en-SG" smtClean="0"/>
-              <a:t>13/4/2019</a:t>
+              <a:t>14/4/2019</a:t>
             </a:fld>
             <a:endParaRPr lang="en-SG"/>
           </a:p>
@@ -1836,7 +1837,7 @@
           <a:p>
             <a:fld id="{1F8333B6-6859-461A-835D-16D711F5D478}" type="datetimeFigureOut">
               <a:rPr lang="en-SG" smtClean="0"/>
-              <a:t>13/4/2019</a:t>
+              <a:t>14/4/2019</a:t>
             </a:fld>
             <a:endParaRPr lang="en-SG"/>
           </a:p>
@@ -1978,7 +1979,7 @@
           <a:p>
             <a:fld id="{1F8333B6-6859-461A-835D-16D711F5D478}" type="datetimeFigureOut">
               <a:rPr lang="en-SG" smtClean="0"/>
-              <a:t>13/4/2019</a:t>
+              <a:t>14/4/2019</a:t>
             </a:fld>
             <a:endParaRPr lang="en-SG"/>
           </a:p>
@@ -2091,7 +2092,7 @@
           <a:p>
             <a:fld id="{1F8333B6-6859-461A-835D-16D711F5D478}" type="datetimeFigureOut">
               <a:rPr lang="en-SG" smtClean="0"/>
-              <a:t>13/4/2019</a:t>
+              <a:t>14/4/2019</a:t>
             </a:fld>
             <a:endParaRPr lang="en-SG"/>
           </a:p>
@@ -2404,7 +2405,7 @@
           <a:p>
             <a:fld id="{1F8333B6-6859-461A-835D-16D711F5D478}" type="datetimeFigureOut">
               <a:rPr lang="en-SG" smtClean="0"/>
-              <a:t>13/4/2019</a:t>
+              <a:t>14/4/2019</a:t>
             </a:fld>
             <a:endParaRPr lang="en-SG"/>
           </a:p>
@@ -2693,7 +2694,7 @@
           <a:p>
             <a:fld id="{1F8333B6-6859-461A-835D-16D711F5D478}" type="datetimeFigureOut">
               <a:rPr lang="en-SG" smtClean="0"/>
-              <a:t>13/4/2019</a:t>
+              <a:t>14/4/2019</a:t>
             </a:fld>
             <a:endParaRPr lang="en-SG"/>
           </a:p>
@@ -2936,7 +2937,7 @@
           <a:p>
             <a:fld id="{1F8333B6-6859-461A-835D-16D711F5D478}" type="datetimeFigureOut">
               <a:rPr lang="en-SG" smtClean="0"/>
-              <a:t>13/4/2019</a:t>
+              <a:t>14/4/2019</a:t>
             </a:fld>
             <a:endParaRPr lang="en-SG"/>
           </a:p>
@@ -5850,6 +5851,284 @@
 </p:sld>
 </file>
 
+<file path=ppt/slides/slide8.xml><?xml version="1.0" encoding="utf-8"?>
+<p:sld xmlns:a="http://schemas.openxmlformats.org/drawingml/2006/main" xmlns:r="http://schemas.openxmlformats.org/officeDocument/2006/relationships" xmlns:p="http://schemas.openxmlformats.org/presentationml/2006/main">
+  <p:cSld>
+    <p:spTree>
+      <p:nvGrpSpPr>
+        <p:cNvPr id="1" name=""/>
+        <p:cNvGrpSpPr/>
+        <p:nvPr/>
+      </p:nvGrpSpPr>
+      <p:grpSpPr>
+        <a:xfrm>
+          <a:off x="0" y="0"/>
+          <a:ext cx="0" cy="0"/>
+          <a:chOff x="0" y="0"/>
+          <a:chExt cx="0" cy="0"/>
+        </a:xfrm>
+      </p:grpSpPr>
+      <p:pic>
+        <p:nvPicPr>
+          <p:cNvPr id="4" name="Picture 3">
+            <a:extLst>
+              <a:ext uri="{FF2B5EF4-FFF2-40B4-BE49-F238E27FC236}">
+                <a16:creationId xmlns:a16="http://schemas.microsoft.com/office/drawing/2014/main" id="{AB242BFD-2DB0-4743-ADAD-0D230BC4EF55}"/>
+              </a:ext>
+            </a:extLst>
+          </p:cNvPr>
+          <p:cNvPicPr>
+            <a:picLocks noChangeAspect="1"/>
+          </p:cNvPicPr>
+          <p:nvPr/>
+        </p:nvPicPr>
+        <p:blipFill>
+          <a:blip r:embed="rId2">
+            <a:extLst>
+              <a:ext uri="{28A0092B-C50C-407E-A947-70E740481C1C}">
+                <a14:useLocalDpi xmlns:a14="http://schemas.microsoft.com/office/drawing/2010/main" val="0"/>
+              </a:ext>
+            </a:extLst>
+          </a:blip>
+          <a:stretch>
+            <a:fillRect/>
+          </a:stretch>
+        </p:blipFill>
+        <p:spPr>
+          <a:xfrm>
+            <a:off x="475020" y="604839"/>
+            <a:ext cx="3642676" cy="3162574"/>
+          </a:xfrm>
+          <a:prstGeom prst="rect">
+            <a:avLst/>
+          </a:prstGeom>
+        </p:spPr>
+      </p:pic>
+      <p:sp>
+        <p:nvSpPr>
+          <p:cNvPr id="5" name="Speech Bubble: Rectangle 4">
+            <a:extLst>
+              <a:ext uri="{FF2B5EF4-FFF2-40B4-BE49-F238E27FC236}">
+                <a16:creationId xmlns:a16="http://schemas.microsoft.com/office/drawing/2014/main" id="{A27166B2-1404-44C0-99D6-DAC7CFF3D607}"/>
+              </a:ext>
+            </a:extLst>
+          </p:cNvPr>
+          <p:cNvSpPr/>
+          <p:nvPr/>
+        </p:nvSpPr>
+        <p:spPr>
+          <a:xfrm>
+            <a:off x="2905958" y="2554934"/>
+            <a:ext cx="1042416" cy="621792"/>
+          </a:xfrm>
+          <a:prstGeom prst="wedgeRectCallout">
+            <a:avLst>
+              <a:gd name="adj1" fmla="val -69251"/>
+              <a:gd name="adj2" fmla="val 21120"/>
+            </a:avLst>
+          </a:prstGeom>
+          <a:solidFill>
+            <a:schemeClr val="bg1"/>
+          </a:solidFill>
+          <a:ln>
+            <a:noFill/>
+          </a:ln>
+        </p:spPr>
+        <p:style>
+          <a:lnRef idx="2">
+            <a:schemeClr val="accent1">
+              <a:shade val="50000"/>
+            </a:schemeClr>
+          </a:lnRef>
+          <a:fillRef idx="1">
+            <a:schemeClr val="accent1"/>
+          </a:fillRef>
+          <a:effectRef idx="0">
+            <a:schemeClr val="accent1"/>
+          </a:effectRef>
+          <a:fontRef idx="minor">
+            <a:schemeClr val="lt1"/>
+          </a:fontRef>
+        </p:style>
+        <p:txBody>
+          <a:bodyPr rtlCol="0" anchor="ctr"/>
+          <a:lstStyle/>
+          <a:p>
+            <a:pPr algn="ctr"/>
+            <a:r>
+              <a:rPr lang="en-SG" dirty="0">
+                <a:solidFill>
+                  <a:schemeClr val="tx1"/>
+                </a:solidFill>
+              </a:rPr>
+              <a:t>Incorrect options</a:t>
+            </a:r>
+          </a:p>
+        </p:txBody>
+      </p:sp>
+      <p:sp>
+        <p:nvSpPr>
+          <p:cNvPr id="6" name="Rectangle 5">
+            <a:extLst>
+              <a:ext uri="{FF2B5EF4-FFF2-40B4-BE49-F238E27FC236}">
+                <a16:creationId xmlns:a16="http://schemas.microsoft.com/office/drawing/2014/main" id="{BFDD240E-AFEF-43CB-8F9A-329A96920BFE}"/>
+              </a:ext>
+            </a:extLst>
+          </p:cNvPr>
+          <p:cNvSpPr/>
+          <p:nvPr/>
+        </p:nvSpPr>
+        <p:spPr>
+          <a:xfrm>
+            <a:off x="1948886" y="2670758"/>
+            <a:ext cx="694944" cy="621792"/>
+          </a:xfrm>
+          <a:prstGeom prst="rect">
+            <a:avLst/>
+          </a:prstGeom>
+          <a:noFill/>
+          <a:ln>
+            <a:solidFill>
+              <a:srgbClr val="FFFF00"/>
+            </a:solidFill>
+          </a:ln>
+        </p:spPr>
+        <p:style>
+          <a:lnRef idx="2">
+            <a:schemeClr val="accent1">
+              <a:shade val="50000"/>
+            </a:schemeClr>
+          </a:lnRef>
+          <a:fillRef idx="1">
+            <a:schemeClr val="accent1"/>
+          </a:fillRef>
+          <a:effectRef idx="0">
+            <a:schemeClr val="accent1"/>
+          </a:effectRef>
+          <a:fontRef idx="minor">
+            <a:schemeClr val="lt1"/>
+          </a:fontRef>
+        </p:style>
+        <p:txBody>
+          <a:bodyPr rtlCol="0" anchor="ctr"/>
+          <a:lstStyle/>
+          <a:p>
+            <a:pPr algn="ctr"/>
+            <a:endParaRPr lang="en-SG"/>
+          </a:p>
+        </p:txBody>
+      </p:sp>
+      <p:pic>
+        <p:nvPicPr>
+          <p:cNvPr id="7" name="Picture 6">
+            <a:extLst>
+              <a:ext uri="{FF2B5EF4-FFF2-40B4-BE49-F238E27FC236}">
+                <a16:creationId xmlns:a16="http://schemas.microsoft.com/office/drawing/2014/main" id="{DEFB38D5-8C38-46B1-81F0-1FDFD70EAD3A}"/>
+              </a:ext>
+            </a:extLst>
+          </p:cNvPr>
+          <p:cNvPicPr>
+            <a:picLocks noChangeAspect="1"/>
+          </p:cNvPicPr>
+          <p:nvPr/>
+        </p:nvPicPr>
+        <p:blipFill>
+          <a:blip r:embed="rId3">
+            <a:extLst>
+              <a:ext uri="{28A0092B-C50C-407E-A947-70E740481C1C}">
+                <a14:useLocalDpi xmlns:a14="http://schemas.microsoft.com/office/drawing/2010/main" val="0"/>
+              </a:ext>
+            </a:extLst>
+          </a:blip>
+          <a:stretch>
+            <a:fillRect/>
+          </a:stretch>
+        </p:blipFill>
+        <p:spPr>
+          <a:xfrm>
+            <a:off x="5282907" y="2091638"/>
+            <a:ext cx="3650296" cy="2766300"/>
+          </a:xfrm>
+          <a:prstGeom prst="rect">
+            <a:avLst/>
+          </a:prstGeom>
+        </p:spPr>
+      </p:pic>
+      <p:sp>
+        <p:nvSpPr>
+          <p:cNvPr id="8" name="Speech Bubble: Rectangle 7">
+            <a:extLst>
+              <a:ext uri="{FF2B5EF4-FFF2-40B4-BE49-F238E27FC236}">
+                <a16:creationId xmlns:a16="http://schemas.microsoft.com/office/drawing/2014/main" id="{C4428B2F-80A1-4B8F-9503-83BB38AD8ADA}"/>
+              </a:ext>
+            </a:extLst>
+          </p:cNvPr>
+          <p:cNvSpPr/>
+          <p:nvPr/>
+        </p:nvSpPr>
+        <p:spPr>
+          <a:xfrm>
+            <a:off x="6586847" y="4266667"/>
+            <a:ext cx="1042416" cy="420624"/>
+          </a:xfrm>
+          <a:prstGeom prst="wedgeRectCallout">
+            <a:avLst>
+              <a:gd name="adj1" fmla="val 21284"/>
+              <a:gd name="adj2" fmla="val -95943"/>
+            </a:avLst>
+          </a:prstGeom>
+          <a:solidFill>
+            <a:schemeClr val="bg1"/>
+          </a:solidFill>
+          <a:ln>
+            <a:noFill/>
+          </a:ln>
+        </p:spPr>
+        <p:style>
+          <a:lnRef idx="2">
+            <a:schemeClr val="accent1">
+              <a:shade val="50000"/>
+            </a:schemeClr>
+          </a:lnRef>
+          <a:fillRef idx="1">
+            <a:schemeClr val="accent1"/>
+          </a:fillRef>
+          <a:effectRef idx="0">
+            <a:schemeClr val="accent1"/>
+          </a:effectRef>
+          <a:fontRef idx="minor">
+            <a:schemeClr val="lt1"/>
+          </a:fontRef>
+        </p:style>
+        <p:txBody>
+          <a:bodyPr rtlCol="0" anchor="ctr"/>
+          <a:lstStyle/>
+          <a:p>
+            <a:pPr algn="ctr"/>
+            <a:r>
+              <a:rPr lang="en-SG" dirty="0">
+                <a:solidFill>
+                  <a:schemeClr val="tx1"/>
+                </a:solidFill>
+              </a:rPr>
+              <a:t>Answer</a:t>
+            </a:r>
+          </a:p>
+        </p:txBody>
+      </p:sp>
+    </p:spTree>
+    <p:extLst>
+      <p:ext uri="{BB962C8B-B14F-4D97-AF65-F5344CB8AC3E}">
+        <p14:creationId xmlns:p14="http://schemas.microsoft.com/office/powerpoint/2010/main" val="3197745255"/>
+      </p:ext>
+    </p:extLst>
+  </p:cSld>
+  <p:clrMapOvr>
+    <a:masterClrMapping/>
+  </p:clrMapOvr>
+</p:sld>
+</file>
+
 <file path=ppt/theme/theme1.xml><?xml version="1.0" encoding="utf-8"?>
 <a:theme xmlns:a="http://schemas.openxmlformats.org/drawingml/2006/main" name="Office Theme">
   <a:themeElements>

</xml_diff>